<commit_message>
Got python to work
</commit_message>
<xml_diff>
--- a/pie-geometrical-method/docs/CalculatePie.pptx
+++ b/pie-geometrical-method/docs/CalculatePie.pptx
@@ -5,7 +5,7 @@
     <p:sldMasterId id="2147483648" r:id="rId1"/>
   </p:sldMasterIdLst>
   <p:notesMasterIdLst>
-    <p:notesMasterId r:id="rId11"/>
+    <p:notesMasterId r:id="rId12"/>
   </p:notesMasterIdLst>
   <p:sldIdLst>
     <p:sldId id="256" r:id="rId2"/>
@@ -17,6 +17,7 @@
     <p:sldId id="263" r:id="rId8"/>
     <p:sldId id="262" r:id="rId9"/>
     <p:sldId id="264" r:id="rId10"/>
+    <p:sldId id="265" r:id="rId11"/>
   </p:sldIdLst>
   <p:sldSz cx="12192000" cy="6858000"/>
   <p:notesSz cx="6858000" cy="9144000"/>
@@ -812,6 +813,93 @@
     <p:extLst>
       <p:ext uri="{BB962C8B-B14F-4D97-AF65-F5344CB8AC3E}">
         <p14:creationId xmlns:p14="http://schemas.microsoft.com/office/powerpoint/2010/main" val="2125775919"/>
+      </p:ext>
+    </p:extLst>
+  </p:cSld>
+  <p:clrMapOvr>
+    <a:masterClrMapping/>
+  </p:clrMapOvr>
+</p:notes>
+</file>
+
+<file path=ppt/notesSlides/notesSlide5.xml><?xml version="1.0" encoding="utf-8"?>
+<p:notes xmlns:a="http://schemas.openxmlformats.org/drawingml/2006/main" xmlns:r="http://schemas.openxmlformats.org/officeDocument/2006/relationships" xmlns:p="http://schemas.openxmlformats.org/presentationml/2006/main">
+  <p:cSld>
+    <p:spTree>
+      <p:nvGrpSpPr>
+        <p:cNvPr id="1" name=""/>
+        <p:cNvGrpSpPr/>
+        <p:nvPr/>
+      </p:nvGrpSpPr>
+      <p:grpSpPr>
+        <a:xfrm>
+          <a:off x="0" y="0"/>
+          <a:ext cx="0" cy="0"/>
+          <a:chOff x="0" y="0"/>
+          <a:chExt cx="0" cy="0"/>
+        </a:xfrm>
+      </p:grpSpPr>
+      <p:sp>
+        <p:nvSpPr>
+          <p:cNvPr id="2" name="Slide Image Placeholder 1"/>
+          <p:cNvSpPr>
+            <a:spLocks noGrp="1" noRot="1" noChangeAspect="1"/>
+          </p:cNvSpPr>
+          <p:nvPr>
+            <p:ph type="sldImg"/>
+          </p:nvPr>
+        </p:nvSpPr>
+        <p:spPr/>
+      </p:sp>
+      <p:sp>
+        <p:nvSpPr>
+          <p:cNvPr id="3" name="Notes Placeholder 2"/>
+          <p:cNvSpPr>
+            <a:spLocks noGrp="1"/>
+          </p:cNvSpPr>
+          <p:nvPr>
+            <p:ph type="body" idx="1"/>
+          </p:nvPr>
+        </p:nvSpPr>
+        <p:spPr/>
+        <p:txBody>
+          <a:bodyPr/>
+          <a:lstStyle/>
+          <a:p>
+            <a:r>
+              <a:rPr lang="en-GB" dirty="0"/>
+              <a:t>results-table.png</a:t>
+            </a:r>
+          </a:p>
+        </p:txBody>
+      </p:sp>
+      <p:sp>
+        <p:nvSpPr>
+          <p:cNvPr id="4" name="Slide Number Placeholder 3"/>
+          <p:cNvSpPr>
+            <a:spLocks noGrp="1"/>
+          </p:cNvSpPr>
+          <p:nvPr>
+            <p:ph type="sldNum" sz="quarter" idx="5"/>
+          </p:nvPr>
+        </p:nvSpPr>
+        <p:spPr/>
+        <p:txBody>
+          <a:bodyPr/>
+          <a:lstStyle/>
+          <a:p>
+            <a:fld id="{83C2492E-88FF-4D7C-91C0-01748C3C9A9D}" type="slidenum">
+              <a:rPr lang="en-GB" smtClean="0"/>
+              <a:t>10</a:t>
+            </a:fld>
+            <a:endParaRPr lang="en-GB"/>
+          </a:p>
+        </p:txBody>
+      </p:sp>
+    </p:spTree>
+    <p:extLst>
+      <p:ext uri="{BB962C8B-B14F-4D97-AF65-F5344CB8AC3E}">
+        <p14:creationId xmlns:p14="http://schemas.microsoft.com/office/powerpoint/2010/main" val="1682157597"/>
       </p:ext>
     </p:extLst>
   </p:cSld>
@@ -4110,6 +4198,984 @@
     <p:extLst>
       <p:ext uri="{BB962C8B-B14F-4D97-AF65-F5344CB8AC3E}">
         <p14:creationId xmlns:p14="http://schemas.microsoft.com/office/powerpoint/2010/main" val="1098911539"/>
+      </p:ext>
+    </p:extLst>
+  </p:cSld>
+  <p:clrMapOvr>
+    <a:masterClrMapping/>
+  </p:clrMapOvr>
+</p:sld>
+</file>
+
+<file path=ppt/slides/slide10.xml><?xml version="1.0" encoding="utf-8"?>
+<p:sld xmlns:a="http://schemas.openxmlformats.org/drawingml/2006/main" xmlns:r="http://schemas.openxmlformats.org/officeDocument/2006/relationships" xmlns:p="http://schemas.openxmlformats.org/presentationml/2006/main">
+  <p:cSld>
+    <p:spTree>
+      <p:nvGrpSpPr>
+        <p:cNvPr id="1" name=""/>
+        <p:cNvGrpSpPr/>
+        <p:nvPr/>
+      </p:nvGrpSpPr>
+      <p:grpSpPr>
+        <a:xfrm>
+          <a:off x="0" y="0"/>
+          <a:ext cx="0" cy="0"/>
+          <a:chOff x="0" y="0"/>
+          <a:chExt cx="0" cy="0"/>
+        </a:xfrm>
+      </p:grpSpPr>
+      <p:graphicFrame>
+        <p:nvGraphicFramePr>
+          <p:cNvPr id="2" name="Table 2">
+            <a:extLst>
+              <a:ext uri="{FF2B5EF4-FFF2-40B4-BE49-F238E27FC236}">
+                <a16:creationId xmlns:a16="http://schemas.microsoft.com/office/drawing/2014/main" id="{40D85FFD-1DD9-608D-37E0-377C7CD1C3A4}"/>
+              </a:ext>
+            </a:extLst>
+          </p:cNvPr>
+          <p:cNvGraphicFramePr>
+            <a:graphicFrameLocks noGrp="1"/>
+          </p:cNvGraphicFramePr>
+          <p:nvPr>
+            <p:extLst>
+              <p:ext uri="{D42A27DB-BD31-4B8C-83A1-F6EECF244321}">
+                <p14:modId xmlns:p14="http://schemas.microsoft.com/office/powerpoint/2010/main" val="3350268857"/>
+              </p:ext>
+            </p:extLst>
+          </p:nvPr>
+        </p:nvGraphicFramePr>
+        <p:xfrm>
+          <a:off x="852255" y="719666"/>
+          <a:ext cx="10227077" cy="4348480"/>
+        </p:xfrm>
+        <a:graphic>
+          <a:graphicData uri="http://schemas.openxmlformats.org/drawingml/2006/table">
+            <a:tbl>
+              <a:tblPr firstRow="1" bandRow="1">
+                <a:tableStyleId>{5C22544A-7EE6-4342-B048-85BDC9FD1C3A}</a:tableStyleId>
+              </a:tblPr>
+              <a:tblGrid>
+                <a:gridCol w="1343844">
+                  <a:extLst>
+                    <a:ext uri="{9D8B030D-6E8A-4147-A177-3AD203B41FA5}">
+                      <a16:colId xmlns:a16="http://schemas.microsoft.com/office/drawing/2014/main" val="1924429027"/>
+                    </a:ext>
+                  </a:extLst>
+                </a:gridCol>
+                <a:gridCol w="1499446">
+                  <a:extLst>
+                    <a:ext uri="{9D8B030D-6E8A-4147-A177-3AD203B41FA5}">
+                      <a16:colId xmlns:a16="http://schemas.microsoft.com/office/drawing/2014/main" val="4144027158"/>
+                    </a:ext>
+                  </a:extLst>
+                </a:gridCol>
+                <a:gridCol w="2435405">
+                  <a:extLst>
+                    <a:ext uri="{9D8B030D-6E8A-4147-A177-3AD203B41FA5}">
+                      <a16:colId xmlns:a16="http://schemas.microsoft.com/office/drawing/2014/main" val="581830581"/>
+                    </a:ext>
+                  </a:extLst>
+                </a:gridCol>
+                <a:gridCol w="2425346">
+                  <a:extLst>
+                    <a:ext uri="{9D8B030D-6E8A-4147-A177-3AD203B41FA5}">
+                      <a16:colId xmlns:a16="http://schemas.microsoft.com/office/drawing/2014/main" val="3672749653"/>
+                    </a:ext>
+                  </a:extLst>
+                </a:gridCol>
+                <a:gridCol w="2523036">
+                  <a:extLst>
+                    <a:ext uri="{9D8B030D-6E8A-4147-A177-3AD203B41FA5}">
+                      <a16:colId xmlns:a16="http://schemas.microsoft.com/office/drawing/2014/main" val="551541925"/>
+                    </a:ext>
+                  </a:extLst>
+                </a:gridCol>
+              </a:tblGrid>
+              <a:tr h="370840">
+                <a:tc>
+                  <a:txBody>
+                    <a:bodyPr/>
+                    <a:lstStyle/>
+                    <a:p>
+                      <a:pPr marL="0" marR="0" lvl="0" indent="0" algn="l" defTabSz="914400" rtl="0" eaLnBrk="1" fontAlgn="auto" latinLnBrk="0" hangingPunct="1">
+                        <a:lnSpc>
+                          <a:spcPct val="100000"/>
+                        </a:lnSpc>
+                        <a:spcBef>
+                          <a:spcPts val="0"/>
+                        </a:spcBef>
+                        <a:spcAft>
+                          <a:spcPts val="0"/>
+                        </a:spcAft>
+                        <a:buClrTx/>
+                        <a:buSzTx/>
+                        <a:buFontTx/>
+                        <a:buNone/>
+                        <a:tabLst/>
+                        <a:defRPr/>
+                      </a:pPr>
+                      <a:r>
+                        <a:rPr lang="en-GB" sz="1800" b="0" kern="1200" dirty="0">
+                          <a:solidFill>
+                            <a:schemeClr val="lt1"/>
+                          </a:solidFill>
+                          <a:effectLst/>
+                          <a:latin typeface="+mn-lt"/>
+                          <a:ea typeface="+mn-ea"/>
+                          <a:cs typeface="+mn-cs"/>
+                        </a:rPr>
+                        <a:t>Iteration </a:t>
+                      </a:r>
+                    </a:p>
+                    <a:p>
+                      <a:pPr marL="0" marR="0" lvl="0" indent="0" algn="l" defTabSz="914400" rtl="0" eaLnBrk="1" fontAlgn="auto" latinLnBrk="0" hangingPunct="1">
+                        <a:lnSpc>
+                          <a:spcPct val="100000"/>
+                        </a:lnSpc>
+                        <a:spcBef>
+                          <a:spcPts val="0"/>
+                        </a:spcBef>
+                        <a:spcAft>
+                          <a:spcPts val="0"/>
+                        </a:spcAft>
+                        <a:buClrTx/>
+                        <a:buSzTx/>
+                        <a:buFontTx/>
+                        <a:buNone/>
+                        <a:tabLst/>
+                        <a:defRPr/>
+                      </a:pPr>
+                      <a:r>
+                        <a:rPr lang="en-GB" sz="1800" b="0" kern="1200" dirty="0">
+                          <a:solidFill>
+                            <a:schemeClr val="lt1"/>
+                          </a:solidFill>
+                          <a:effectLst/>
+                          <a:latin typeface="+mn-lt"/>
+                          <a:ea typeface="+mn-ea"/>
+                          <a:cs typeface="+mn-cs"/>
+                        </a:rPr>
+                        <a:t>number (n)</a:t>
+                      </a:r>
+                    </a:p>
+                  </a:txBody>
+                  <a:tcPr/>
+                </a:tc>
+                <a:tc>
+                  <a:txBody>
+                    <a:bodyPr/>
+                    <a:lstStyle/>
+                    <a:p>
+                      <a:r>
+                        <a:rPr lang="en-GB" dirty="0"/>
+                        <a:t> Number</a:t>
+                      </a:r>
+                    </a:p>
+                    <a:p>
+                      <a:r>
+                        <a:rPr lang="en-GB" dirty="0"/>
+                        <a:t> of sides</a:t>
+                      </a:r>
+                    </a:p>
+                  </a:txBody>
+                  <a:tcPr/>
+                </a:tc>
+                <a:tc>
+                  <a:txBody>
+                    <a:bodyPr/>
+                    <a:lstStyle/>
+                    <a:p>
+                      <a:r>
+                        <a:rPr lang="en-GB" dirty="0"/>
+                        <a:t>Length of  one side </a:t>
+                      </a:r>
+                    </a:p>
+                    <a:p>
+                      <a:r>
+                        <a:rPr lang="en-GB" dirty="0"/>
+                        <a:t>of the regular polygon</a:t>
+                      </a:r>
+                    </a:p>
+                  </a:txBody>
+                  <a:tcPr/>
+                </a:tc>
+                <a:tc>
+                  <a:txBody>
+                    <a:bodyPr/>
+                    <a:lstStyle/>
+                    <a:p>
+                      <a:r>
+                        <a:rPr lang="en-GB" dirty="0"/>
+                        <a:t>Perimeter</a:t>
+                      </a:r>
+                    </a:p>
+                  </a:txBody>
+                  <a:tcPr/>
+                </a:tc>
+                <a:tc>
+                  <a:txBody>
+                    <a:bodyPr/>
+                    <a:lstStyle/>
+                    <a:p>
+                      <a:r>
+                        <a:rPr lang="en-GB" dirty="0"/>
+                        <a:t>Calculated PIE</a:t>
+                      </a:r>
+                    </a:p>
+                  </a:txBody>
+                  <a:tcPr/>
+                </a:tc>
+                <a:extLst>
+                  <a:ext uri="{0D108BD9-81ED-4DB2-BD59-A6C34878D82A}">
+                    <a16:rowId xmlns:a16="http://schemas.microsoft.com/office/drawing/2014/main" val="3749633567"/>
+                  </a:ext>
+                </a:extLst>
+              </a:tr>
+              <a:tr h="370840">
+                <a:tc>
+                  <a:txBody>
+                    <a:bodyPr/>
+                    <a:lstStyle/>
+                    <a:p>
+                      <a:r>
+                        <a:rPr lang="en-GB" dirty="0"/>
+                        <a:t>0</a:t>
+                      </a:r>
+                    </a:p>
+                  </a:txBody>
+                  <a:tcPr/>
+                </a:tc>
+                <a:tc>
+                  <a:txBody>
+                    <a:bodyPr/>
+                    <a:lstStyle/>
+                    <a:p>
+                      <a:r>
+                        <a:rPr lang="en-GB" dirty="0"/>
+                        <a:t>4</a:t>
+                      </a:r>
+                    </a:p>
+                  </a:txBody>
+                  <a:tcPr/>
+                </a:tc>
+                <a:tc>
+                  <a:txBody>
+                    <a:bodyPr/>
+                    <a:lstStyle/>
+                    <a:p>
+                      <a:r>
+                        <a:rPr lang="en-GB" dirty="0"/>
+                        <a:t>1.414213562373095</a:t>
+                      </a:r>
+                    </a:p>
+                  </a:txBody>
+                  <a:tcPr/>
+                </a:tc>
+                <a:tc>
+                  <a:txBody>
+                    <a:bodyPr/>
+                    <a:lstStyle/>
+                    <a:p>
+                      <a:pPr marL="0" marR="0" lvl="0" indent="0" algn="l" defTabSz="914400" rtl="0" eaLnBrk="1" fontAlgn="auto" latinLnBrk="0" hangingPunct="1">
+                        <a:lnSpc>
+                          <a:spcPct val="100000"/>
+                        </a:lnSpc>
+                        <a:spcBef>
+                          <a:spcPts val="0"/>
+                        </a:spcBef>
+                        <a:spcAft>
+                          <a:spcPts val="0"/>
+                        </a:spcAft>
+                        <a:buClrTx/>
+                        <a:buSzTx/>
+                        <a:buFontTx/>
+                        <a:buNone/>
+                        <a:tabLst/>
+                        <a:defRPr/>
+                      </a:pPr>
+                      <a:r>
+                        <a:rPr lang="en-GB" dirty="0"/>
+                        <a:t>5.656854249492381</a:t>
+                      </a:r>
+                    </a:p>
+                  </a:txBody>
+                  <a:tcPr/>
+                </a:tc>
+                <a:tc>
+                  <a:txBody>
+                    <a:bodyPr/>
+                    <a:lstStyle/>
+                    <a:p>
+                      <a:r>
+                        <a:rPr lang="en-GB" dirty="0"/>
+                        <a:t>2.8284271247461903</a:t>
+                      </a:r>
+                    </a:p>
+                  </a:txBody>
+                  <a:tcPr/>
+                </a:tc>
+                <a:extLst>
+                  <a:ext uri="{0D108BD9-81ED-4DB2-BD59-A6C34878D82A}">
+                    <a16:rowId xmlns:a16="http://schemas.microsoft.com/office/drawing/2014/main" val="1966436777"/>
+                  </a:ext>
+                </a:extLst>
+              </a:tr>
+              <a:tr h="370840">
+                <a:tc>
+                  <a:txBody>
+                    <a:bodyPr/>
+                    <a:lstStyle/>
+                    <a:p>
+                      <a:r>
+                        <a:rPr lang="en-GB" dirty="0"/>
+                        <a:t>1</a:t>
+                      </a:r>
+                    </a:p>
+                  </a:txBody>
+                  <a:tcPr/>
+                </a:tc>
+                <a:tc>
+                  <a:txBody>
+                    <a:bodyPr/>
+                    <a:lstStyle/>
+                    <a:p>
+                      <a:r>
+                        <a:rPr lang="en-GB" dirty="0"/>
+                        <a:t>8</a:t>
+                      </a:r>
+                    </a:p>
+                  </a:txBody>
+                  <a:tcPr/>
+                </a:tc>
+                <a:tc>
+                  <a:txBody>
+                    <a:bodyPr/>
+                    <a:lstStyle/>
+                    <a:p>
+                      <a:r>
+                        <a:rPr lang="en-GB" dirty="0"/>
+                        <a:t>0.7653668647301797</a:t>
+                      </a:r>
+                    </a:p>
+                  </a:txBody>
+                  <a:tcPr/>
+                </a:tc>
+                <a:tc>
+                  <a:txBody>
+                    <a:bodyPr/>
+                    <a:lstStyle/>
+                    <a:p>
+                      <a:r>
+                        <a:rPr lang="en-GB" dirty="0"/>
+                        <a:t>6.122934917841437</a:t>
+                      </a:r>
+                    </a:p>
+                  </a:txBody>
+                  <a:tcPr/>
+                </a:tc>
+                <a:tc>
+                  <a:txBody>
+                    <a:bodyPr/>
+                    <a:lstStyle/>
+                    <a:p>
+                      <a:r>
+                        <a:rPr lang="en-GB" dirty="0"/>
+                        <a:t>3.0614674589207187</a:t>
+                      </a:r>
+                    </a:p>
+                  </a:txBody>
+                  <a:tcPr/>
+                </a:tc>
+                <a:extLst>
+                  <a:ext uri="{0D108BD9-81ED-4DB2-BD59-A6C34878D82A}">
+                    <a16:rowId xmlns:a16="http://schemas.microsoft.com/office/drawing/2014/main" val="1972173956"/>
+                  </a:ext>
+                </a:extLst>
+              </a:tr>
+              <a:tr h="370840">
+                <a:tc>
+                  <a:txBody>
+                    <a:bodyPr/>
+                    <a:lstStyle/>
+                    <a:p>
+                      <a:r>
+                        <a:rPr lang="en-GB" dirty="0"/>
+                        <a:t>2</a:t>
+                      </a:r>
+                    </a:p>
+                  </a:txBody>
+                  <a:tcPr/>
+                </a:tc>
+                <a:tc>
+                  <a:txBody>
+                    <a:bodyPr/>
+                    <a:lstStyle/>
+                    <a:p>
+                      <a:r>
+                        <a:rPr lang="en-GB" dirty="0"/>
+                        <a:t>16</a:t>
+                      </a:r>
+                    </a:p>
+                  </a:txBody>
+                  <a:tcPr/>
+                </a:tc>
+                <a:tc>
+                  <a:txBody>
+                    <a:bodyPr/>
+                    <a:lstStyle/>
+                    <a:p>
+                      <a:r>
+                        <a:rPr lang="en-GB" dirty="0"/>
+                        <a:t>0.3901806440322566</a:t>
+                      </a:r>
+                    </a:p>
+                  </a:txBody>
+                  <a:tcPr/>
+                </a:tc>
+                <a:tc>
+                  <a:txBody>
+                    <a:bodyPr/>
+                    <a:lstStyle/>
+                    <a:p>
+                      <a:r>
+                        <a:rPr lang="en-GB" dirty="0"/>
+                        <a:t>6.242890304516106</a:t>
+                      </a:r>
+                    </a:p>
+                  </a:txBody>
+                  <a:tcPr/>
+                </a:tc>
+                <a:tc>
+                  <a:txBody>
+                    <a:bodyPr/>
+                    <a:lstStyle/>
+                    <a:p>
+                      <a:r>
+                        <a:rPr lang="en-GB" dirty="0"/>
+                        <a:t>3.121445152258053</a:t>
+                      </a:r>
+                    </a:p>
+                  </a:txBody>
+                  <a:tcPr/>
+                </a:tc>
+                <a:extLst>
+                  <a:ext uri="{0D108BD9-81ED-4DB2-BD59-A6C34878D82A}">
+                    <a16:rowId xmlns:a16="http://schemas.microsoft.com/office/drawing/2014/main" val="3174289661"/>
+                  </a:ext>
+                </a:extLst>
+              </a:tr>
+              <a:tr h="370840">
+                <a:tc>
+                  <a:txBody>
+                    <a:bodyPr/>
+                    <a:lstStyle/>
+                    <a:p>
+                      <a:r>
+                        <a:rPr lang="en-GB" dirty="0"/>
+                        <a:t>3</a:t>
+                      </a:r>
+                    </a:p>
+                  </a:txBody>
+                  <a:tcPr/>
+                </a:tc>
+                <a:tc>
+                  <a:txBody>
+                    <a:bodyPr/>
+                    <a:lstStyle/>
+                    <a:p>
+                      <a:r>
+                        <a:rPr lang="en-GB" dirty="0"/>
+                        <a:t>32</a:t>
+                      </a:r>
+                    </a:p>
+                  </a:txBody>
+                  <a:tcPr/>
+                </a:tc>
+                <a:tc>
+                  <a:txBody>
+                    <a:bodyPr/>
+                    <a:lstStyle/>
+                    <a:p>
+                      <a:r>
+                        <a:rPr lang="en-GB" dirty="0"/>
+                        <a:t>0.19603428065912124</a:t>
+                      </a:r>
+                    </a:p>
+                  </a:txBody>
+                  <a:tcPr/>
+                </a:tc>
+                <a:tc>
+                  <a:txBody>
+                    <a:bodyPr/>
+                    <a:lstStyle/>
+                    <a:p>
+                      <a:r>
+                        <a:rPr lang="en-GB" dirty="0"/>
+                        <a:t>6.2730969810918795</a:t>
+                      </a:r>
+                    </a:p>
+                  </a:txBody>
+                  <a:tcPr/>
+                </a:tc>
+                <a:tc>
+                  <a:txBody>
+                    <a:bodyPr/>
+                    <a:lstStyle/>
+                    <a:p>
+                      <a:r>
+                        <a:rPr lang="en-GB" dirty="0"/>
+                        <a:t>3.1365484905459398</a:t>
+                      </a:r>
+                    </a:p>
+                  </a:txBody>
+                  <a:tcPr/>
+                </a:tc>
+                <a:extLst>
+                  <a:ext uri="{0D108BD9-81ED-4DB2-BD59-A6C34878D82A}">
+                    <a16:rowId xmlns:a16="http://schemas.microsoft.com/office/drawing/2014/main" val="3762253924"/>
+                  </a:ext>
+                </a:extLst>
+              </a:tr>
+              <a:tr h="370840">
+                <a:tc>
+                  <a:txBody>
+                    <a:bodyPr/>
+                    <a:lstStyle/>
+                    <a:p>
+                      <a:r>
+                        <a:rPr lang="en-GB" dirty="0"/>
+                        <a:t>4</a:t>
+                      </a:r>
+                    </a:p>
+                  </a:txBody>
+                  <a:tcPr/>
+                </a:tc>
+                <a:tc>
+                  <a:txBody>
+                    <a:bodyPr/>
+                    <a:lstStyle/>
+                    <a:p>
+                      <a:r>
+                        <a:rPr lang="en-GB" dirty="0"/>
+                        <a:t>64</a:t>
+                      </a:r>
+                    </a:p>
+                  </a:txBody>
+                  <a:tcPr/>
+                </a:tc>
+                <a:tc>
+                  <a:txBody>
+                    <a:bodyPr/>
+                    <a:lstStyle/>
+                    <a:p>
+                      <a:r>
+                        <a:rPr lang="en-GB" dirty="0"/>
+                        <a:t>0.09813534865483604</a:t>
+                      </a:r>
+                    </a:p>
+                  </a:txBody>
+                  <a:tcPr/>
+                </a:tc>
+                <a:tc>
+                  <a:txBody>
+                    <a:bodyPr/>
+                    <a:lstStyle/>
+                    <a:p>
+                      <a:r>
+                        <a:rPr lang="en-GB" dirty="0"/>
+                        <a:t>6.280662313909507</a:t>
+                      </a:r>
+                    </a:p>
+                  </a:txBody>
+                  <a:tcPr/>
+                </a:tc>
+                <a:tc>
+                  <a:txBody>
+                    <a:bodyPr/>
+                    <a:lstStyle/>
+                    <a:p>
+                      <a:r>
+                        <a:rPr lang="en-GB" dirty="0"/>
+                        <a:t>3.1403311569547534</a:t>
+                      </a:r>
+                    </a:p>
+                  </a:txBody>
+                  <a:tcPr/>
+                </a:tc>
+                <a:extLst>
+                  <a:ext uri="{0D108BD9-81ED-4DB2-BD59-A6C34878D82A}">
+                    <a16:rowId xmlns:a16="http://schemas.microsoft.com/office/drawing/2014/main" val="4120049565"/>
+                  </a:ext>
+                </a:extLst>
+              </a:tr>
+              <a:tr h="370840">
+                <a:tc>
+                  <a:txBody>
+                    <a:bodyPr/>
+                    <a:lstStyle/>
+                    <a:p>
+                      <a:r>
+                        <a:rPr lang="en-GB" dirty="0"/>
+                        <a:t>5</a:t>
+                      </a:r>
+                    </a:p>
+                  </a:txBody>
+                  <a:tcPr/>
+                </a:tc>
+                <a:tc>
+                  <a:txBody>
+                    <a:bodyPr/>
+                    <a:lstStyle/>
+                    <a:p>
+                      <a:r>
+                        <a:rPr lang="en-GB" dirty="0"/>
+                        <a:t>128</a:t>
+                      </a:r>
+                    </a:p>
+                  </a:txBody>
+                  <a:tcPr/>
+                </a:tc>
+                <a:tc>
+                  <a:txBody>
+                    <a:bodyPr/>
+                    <a:lstStyle/>
+                    <a:p>
+                      <a:r>
+                        <a:rPr lang="en-GB" dirty="0"/>
+                        <a:t>0.04908245704582458</a:t>
+                      </a:r>
+                    </a:p>
+                  </a:txBody>
+                  <a:tcPr/>
+                </a:tc>
+                <a:tc>
+                  <a:txBody>
+                    <a:bodyPr/>
+                    <a:lstStyle/>
+                    <a:p>
+                      <a:r>
+                        <a:rPr lang="en-GB" dirty="0"/>
+                        <a:t>6.282554501865547</a:t>
+                      </a:r>
+                    </a:p>
+                  </a:txBody>
+                  <a:tcPr/>
+                </a:tc>
+                <a:tc>
+                  <a:txBody>
+                    <a:bodyPr/>
+                    <a:lstStyle/>
+                    <a:p>
+                      <a:r>
+                        <a:rPr lang="en-GB" dirty="0"/>
+                        <a:t>3.1412772509327733</a:t>
+                      </a:r>
+                    </a:p>
+                  </a:txBody>
+                  <a:tcPr/>
+                </a:tc>
+                <a:extLst>
+                  <a:ext uri="{0D108BD9-81ED-4DB2-BD59-A6C34878D82A}">
+                    <a16:rowId xmlns:a16="http://schemas.microsoft.com/office/drawing/2014/main" val="2700542755"/>
+                  </a:ext>
+                </a:extLst>
+              </a:tr>
+              <a:tr h="370840">
+                <a:tc>
+                  <a:txBody>
+                    <a:bodyPr/>
+                    <a:lstStyle/>
+                    <a:p>
+                      <a:r>
+                        <a:rPr lang="en-GB" dirty="0"/>
+                        <a:t>6</a:t>
+                      </a:r>
+                    </a:p>
+                  </a:txBody>
+                  <a:tcPr/>
+                </a:tc>
+                <a:tc>
+                  <a:txBody>
+                    <a:bodyPr/>
+                    <a:lstStyle/>
+                    <a:p>
+                      <a:r>
+                        <a:rPr lang="en-GB" dirty="0"/>
+                        <a:t>256</a:t>
+                      </a:r>
+                    </a:p>
+                  </a:txBody>
+                  <a:tcPr/>
+                </a:tc>
+                <a:tc>
+                  <a:txBody>
+                    <a:bodyPr/>
+                    <a:lstStyle/>
+                    <a:p>
+                      <a:r>
+                        <a:rPr lang="en-GB" dirty="0"/>
+                        <a:t>0.02454307657143985</a:t>
+                      </a:r>
+                    </a:p>
+                  </a:txBody>
+                  <a:tcPr/>
+                </a:tc>
+                <a:tc>
+                  <a:txBody>
+                    <a:bodyPr/>
+                    <a:lstStyle/>
+                    <a:p>
+                      <a:r>
+                        <a:rPr lang="en-GB" dirty="0"/>
+                        <a:t>6.283027602288603</a:t>
+                      </a:r>
+                    </a:p>
+                  </a:txBody>
+                  <a:tcPr/>
+                </a:tc>
+                <a:tc>
+                  <a:txBody>
+                    <a:bodyPr/>
+                    <a:lstStyle/>
+                    <a:p>
+                      <a:r>
+                        <a:rPr lang="en-GB" dirty="0"/>
+                        <a:t>3.1415138011443013</a:t>
+                      </a:r>
+                    </a:p>
+                  </a:txBody>
+                  <a:tcPr/>
+                </a:tc>
+                <a:extLst>
+                  <a:ext uri="{0D108BD9-81ED-4DB2-BD59-A6C34878D82A}">
+                    <a16:rowId xmlns:a16="http://schemas.microsoft.com/office/drawing/2014/main" val="3566330000"/>
+                  </a:ext>
+                </a:extLst>
+              </a:tr>
+              <a:tr h="370840">
+                <a:tc>
+                  <a:txBody>
+                    <a:bodyPr/>
+                    <a:lstStyle/>
+                    <a:p>
+                      <a:r>
+                        <a:rPr lang="en-GB" dirty="0"/>
+                        <a:t>7</a:t>
+                      </a:r>
+                    </a:p>
+                  </a:txBody>
+                  <a:tcPr/>
+                </a:tc>
+                <a:tc>
+                  <a:txBody>
+                    <a:bodyPr/>
+                    <a:lstStyle/>
+                    <a:p>
+                      <a:r>
+                        <a:rPr lang="en-GB" dirty="0"/>
+                        <a:t>512</a:t>
+                      </a:r>
+                    </a:p>
+                  </a:txBody>
+                  <a:tcPr/>
+                </a:tc>
+                <a:tc>
+                  <a:txBody>
+                    <a:bodyPr/>
+                    <a:lstStyle/>
+                    <a:p>
+                      <a:r>
+                        <a:rPr lang="en-GB" dirty="0"/>
+                        <a:t>0.01227176929830895</a:t>
+                      </a:r>
+                    </a:p>
+                  </a:txBody>
+                  <a:tcPr/>
+                </a:tc>
+                <a:tc>
+                  <a:txBody>
+                    <a:bodyPr/>
+                    <a:lstStyle/>
+                    <a:p>
+                      <a:r>
+                        <a:rPr lang="en-GB" dirty="0"/>
+                        <a:t>6.283145880734184</a:t>
+                      </a:r>
+                    </a:p>
+                  </a:txBody>
+                  <a:tcPr/>
+                </a:tc>
+                <a:tc>
+                  <a:txBody>
+                    <a:bodyPr/>
+                    <a:lstStyle/>
+                    <a:p>
+                      <a:r>
+                        <a:rPr lang="en-GB" dirty="0"/>
+                        <a:t>3.141572940367092</a:t>
+                      </a:r>
+                    </a:p>
+                  </a:txBody>
+                  <a:tcPr/>
+                </a:tc>
+                <a:extLst>
+                  <a:ext uri="{0D108BD9-81ED-4DB2-BD59-A6C34878D82A}">
+                    <a16:rowId xmlns:a16="http://schemas.microsoft.com/office/drawing/2014/main" val="1702411517"/>
+                  </a:ext>
+                </a:extLst>
+              </a:tr>
+              <a:tr h="370840">
+                <a:tc>
+                  <a:txBody>
+                    <a:bodyPr/>
+                    <a:lstStyle/>
+                    <a:p>
+                      <a:r>
+                        <a:rPr lang="en-GB" dirty="0"/>
+                        <a:t>8</a:t>
+                      </a:r>
+                    </a:p>
+                  </a:txBody>
+                  <a:tcPr/>
+                </a:tc>
+                <a:tc>
+                  <a:txBody>
+                    <a:bodyPr/>
+                    <a:lstStyle/>
+                    <a:p>
+                      <a:r>
+                        <a:rPr lang="en-GB" dirty="0"/>
+                        <a:t>1024</a:t>
+                      </a:r>
+                    </a:p>
+                  </a:txBody>
+                  <a:tcPr/>
+                </a:tc>
+                <a:tc>
+                  <a:txBody>
+                    <a:bodyPr/>
+                    <a:lstStyle/>
+                    <a:p>
+                      <a:r>
+                        <a:rPr lang="en-GB" dirty="0"/>
+                        <a:t>0.00613591352593195</a:t>
+                      </a:r>
+                    </a:p>
+                  </a:txBody>
+                  <a:tcPr/>
+                </a:tc>
+                <a:tc>
+                  <a:txBody>
+                    <a:bodyPr/>
+                    <a:lstStyle/>
+                    <a:p>
+                      <a:r>
+                        <a:rPr lang="en-GB" dirty="0"/>
+                        <a:t>6.28317545055432</a:t>
+                      </a:r>
+                    </a:p>
+                  </a:txBody>
+                  <a:tcPr/>
+                </a:tc>
+                <a:tc>
+                  <a:txBody>
+                    <a:bodyPr/>
+                    <a:lstStyle/>
+                    <a:p>
+                      <a:r>
+                        <a:rPr lang="en-GB" dirty="0"/>
+                        <a:t>3.14158772527716</a:t>
+                      </a:r>
+                    </a:p>
+                  </a:txBody>
+                  <a:tcPr/>
+                </a:tc>
+                <a:extLst>
+                  <a:ext uri="{0D108BD9-81ED-4DB2-BD59-A6C34878D82A}">
+                    <a16:rowId xmlns:a16="http://schemas.microsoft.com/office/drawing/2014/main" val="1568132366"/>
+                  </a:ext>
+                </a:extLst>
+              </a:tr>
+              <a:tr h="370840">
+                <a:tc>
+                  <a:txBody>
+                    <a:bodyPr/>
+                    <a:lstStyle/>
+                    <a:p>
+                      <a:r>
+                        <a:rPr lang="en-GB" dirty="0"/>
+                        <a:t>9</a:t>
+                      </a:r>
+                    </a:p>
+                  </a:txBody>
+                  <a:tcPr/>
+                </a:tc>
+                <a:tc>
+                  <a:txBody>
+                    <a:bodyPr/>
+                    <a:lstStyle/>
+                    <a:p>
+                      <a:r>
+                        <a:rPr lang="en-GB" dirty="0"/>
+                        <a:t>2048</a:t>
+                      </a:r>
+                    </a:p>
+                  </a:txBody>
+                  <a:tcPr/>
+                </a:tc>
+                <a:tc>
+                  <a:txBody>
+                    <a:bodyPr/>
+                    <a:lstStyle/>
+                    <a:p>
+                      <a:r>
+                        <a:rPr lang="en-GB" dirty="0"/>
+                        <a:t>0.00306796037256953</a:t>
+                      </a:r>
+                    </a:p>
+                  </a:txBody>
+                  <a:tcPr/>
+                </a:tc>
+                <a:tc>
+                  <a:txBody>
+                    <a:bodyPr/>
+                    <a:lstStyle/>
+                    <a:p>
+                      <a:r>
+                        <a:rPr lang="en-GB" dirty="0"/>
+                        <a:t>6.2831828430224</a:t>
+                      </a:r>
+                    </a:p>
+                  </a:txBody>
+                  <a:tcPr/>
+                </a:tc>
+                <a:tc>
+                  <a:txBody>
+                    <a:bodyPr/>
+                    <a:lstStyle/>
+                    <a:p>
+                      <a:r>
+                        <a:rPr lang="en-GB" dirty="0"/>
+                        <a:t>3.1415914215112</a:t>
+                      </a:r>
+                    </a:p>
+                  </a:txBody>
+                  <a:tcPr/>
+                </a:tc>
+                <a:extLst>
+                  <a:ext uri="{0D108BD9-81ED-4DB2-BD59-A6C34878D82A}">
+                    <a16:rowId xmlns:a16="http://schemas.microsoft.com/office/drawing/2014/main" val="944198434"/>
+                  </a:ext>
+                </a:extLst>
+              </a:tr>
+            </a:tbl>
+          </a:graphicData>
+        </a:graphic>
+      </p:graphicFrame>
+    </p:spTree>
+    <p:extLst>
+      <p:ext uri="{BB962C8B-B14F-4D97-AF65-F5344CB8AC3E}">
+        <p14:creationId xmlns:p14="http://schemas.microsoft.com/office/powerpoint/2010/main" val="2887307589"/>
       </p:ext>
     </p:extLst>
   </p:cSld>
@@ -6208,7 +7274,7 @@
         <p:spPr>
           <a:xfrm>
             <a:off x="3762410" y="2129524"/>
-            <a:ext cx="379507" cy="369332"/>
+            <a:ext cx="762137" cy="369332"/>
           </a:xfrm>
           <a:prstGeom prst="rect">
             <a:avLst/>
@@ -6223,7 +7289,7 @@
           <a:p>
             <a:r>
               <a:rPr lang="en-GB" dirty="0"/>
-              <a:t>S</a:t>
+              <a:t>1/2S</a:t>
             </a:r>
             <a:r>
               <a:rPr lang="en-GB" sz="1200" dirty="0"/>
@@ -6466,7 +7532,7 @@
           <a:p>
             <a:r>
               <a:rPr lang="en-GB" dirty="0"/>
-              <a:t>2S</a:t>
+              <a:t>S</a:t>
             </a:r>
             <a:r>
               <a:rPr lang="en-GB" sz="1200" dirty="0"/>
@@ -6567,7 +7633,7 @@
         <p:spPr>
           <a:xfrm>
             <a:off x="3765519" y="3065689"/>
-            <a:ext cx="473081" cy="369332"/>
+            <a:ext cx="645419" cy="553998"/>
           </a:xfrm>
           <a:prstGeom prst="rect">
             <a:avLst/>
@@ -6582,7 +7648,7 @@
           <a:p>
             <a:r>
               <a:rPr lang="en-GB" dirty="0"/>
-              <a:t>S</a:t>
+              <a:t>1/2S</a:t>
             </a:r>
             <a:r>
               <a:rPr lang="en-GB" sz="1200" dirty="0"/>
@@ -7444,7 +8510,7 @@
           <a:p>
             <a:r>
               <a:rPr lang="en-GB" dirty="0"/>
-              <a:t>2S</a:t>
+              <a:t>S</a:t>
             </a:r>
             <a:r>
               <a:rPr lang="en-GB" sz="1200" dirty="0"/>
@@ -7501,7 +8567,7 @@
             <a:pPr algn="ctr"/>
             <a:r>
               <a:rPr lang="en-GB" dirty="0"/>
-              <a:t>Square of side 2*</a:t>
+              <a:t>Square of side </a:t>
             </a:r>
             <a:r>
               <a:rPr lang="en-GB" dirty="0">
@@ -7569,7 +8635,7 @@
             <a:pPr algn="ctr"/>
             <a:r>
               <a:rPr lang="en-GB" dirty="0"/>
-              <a:t>Octagon of side 2*</a:t>
+              <a:t>Octagon of side </a:t>
             </a:r>
             <a:r>
               <a:rPr lang="en-GB" dirty="0">
@@ -7577,7 +8643,7 @@
                   <a:schemeClr val="bg1"/>
                 </a:solidFill>
               </a:rPr>
-              <a:t> S</a:t>
+              <a:t>S</a:t>
             </a:r>
             <a:r>
               <a:rPr lang="en-GB" sz="1200" dirty="0">
@@ -7670,18 +8736,22 @@
           <a:p>
             <a:r>
               <a:rPr lang="en-GB" dirty="0"/>
-              <a:t>Can we come up a formula that gives us the value of given </a:t>
-            </a:r>
-            <a:r>
-              <a:rPr lang="en-GB" b="1" dirty="0"/>
+              <a:t>Can we come up a formula that gives us the value </a:t>
+            </a:r>
+            <a:r>
+              <a:rPr lang="en-GB"/>
+              <a:t>of </a:t>
+            </a:r>
+            <a:r>
+              <a:rPr lang="en-GB" b="1"/>
               <a:t>S</a:t>
             </a:r>
             <a:r>
-              <a:rPr lang="en-GB" sz="1200" b="1" dirty="0"/>
+              <a:rPr lang="en-GB" sz="1200" b="1"/>
               <a:t>1</a:t>
             </a:r>
             <a:r>
-              <a:rPr lang="en-GB" sz="1200" dirty="0"/>
+              <a:rPr lang="en-GB" sz="1200"/>
               <a:t> </a:t>
             </a:r>
             <a:r>
@@ -8048,9 +9118,9 @@
           <p:nvPr/>
         </p:nvCxnSpPr>
         <p:spPr>
-          <a:xfrm>
-            <a:off x="4051225" y="4593910"/>
-            <a:ext cx="2198451" cy="0"/>
+          <a:xfrm flipV="1">
+            <a:off x="4051225" y="4591327"/>
+            <a:ext cx="2955023" cy="2583"/>
           </a:xfrm>
           <a:prstGeom prst="straightConnector1">
             <a:avLst/>
@@ -8090,8 +9160,8 @@
         </p:nvSpPr>
         <p:spPr>
           <a:xfrm>
-            <a:off x="4905821" y="4680062"/>
-            <a:ext cx="881110" cy="369332"/>
+            <a:off x="5223126" y="4664931"/>
+            <a:ext cx="384572" cy="369332"/>
           </a:xfrm>
           <a:prstGeom prst="rect">
             <a:avLst/>
@@ -8106,7 +9176,7 @@
           <a:p>
             <a:r>
               <a:rPr lang="en-GB" dirty="0"/>
-              <a:t>2S</a:t>
+              <a:t>S</a:t>
             </a:r>
             <a:r>
               <a:rPr lang="en-GB" sz="1200" dirty="0"/>
@@ -8580,7 +9650,7 @@
         </p:nvSpPr>
         <p:spPr>
           <a:xfrm>
-            <a:off x="409302" y="338845"/>
+            <a:off x="409302" y="321090"/>
             <a:ext cx="3526914" cy="5632311"/>
           </a:xfrm>
           <a:prstGeom prst="rect">
@@ -9533,8 +10603,8 @@
           </p:sp>
         </mc:Fallback>
       </mc:AlternateContent>
-      <mc:AlternateContent xmlns:mc="http://schemas.openxmlformats.org/markup-compatibility/2006" xmlns:a14="http://schemas.microsoft.com/office/drawing/2010/main">
-        <mc:Choice Requires="a14">
+      <mc:AlternateContent xmlns:mc="http://schemas.openxmlformats.org/markup-compatibility/2006">
+        <mc:Choice xmlns:a14="http://schemas.microsoft.com/office/drawing/2010/main" Requires="a14">
           <p:sp>
             <p:nvSpPr>
               <p:cNvPr id="32" name="TextBox 31">
@@ -9605,13 +10675,27 @@
                 </a14:m>
                 <a:r>
                   <a:rPr lang="en-GB" dirty="0"/>
-                  <a:t> S0</a:t>
+                  <a:t> S0 </a:t>
+                </a:r>
+                <a14:m>
+                  <m:oMath xmlns:m="http://schemas.openxmlformats.org/officeDocument/2006/math">
+                    <m:r>
+                      <a:rPr lang="en-GB" i="1">
+                        <a:latin typeface="Cambria Math" panose="02040503050406030204" pitchFamily="18" charset="0"/>
+                      </a:rPr>
+                      <m:t>/2</m:t>
+                    </m:r>
+                  </m:oMath>
+                </a14:m>
+                <a:r>
+                  <a:rPr lang="en-GB" dirty="0"/>
+                  <a:t> </a:t>
                 </a:r>
               </a:p>
             </p:txBody>
           </p:sp>
         </mc:Choice>
-        <mc:Fallback xmlns="">
+        <mc:Fallback>
           <p:sp>
             <p:nvSpPr>
               <p:cNvPr id="32" name="TextBox 31">
@@ -10072,8 +11156,8 @@
           </p:sp>
         </mc:Fallback>
       </mc:AlternateContent>
-      <mc:AlternateContent xmlns:mc="http://schemas.openxmlformats.org/markup-compatibility/2006" xmlns:a14="http://schemas.microsoft.com/office/drawing/2010/main">
-        <mc:Choice Requires="a14">
+      <mc:AlternateContent xmlns:mc="http://schemas.openxmlformats.org/markup-compatibility/2006">
+        <mc:Choice xmlns:a14="http://schemas.microsoft.com/office/drawing/2010/main" Requires="a14">
           <p:sp>
             <p:nvSpPr>
               <p:cNvPr id="54" name="TextBox 53">
@@ -10230,7 +11314,7 @@
                           <a:rPr lang="en-GB" b="0" i="1" smtClean="0">
                             <a:latin typeface="Cambria Math" panose="02040503050406030204" pitchFamily="18" charset="0"/>
                           </a:rPr>
-                          <m:t>(2∗</m:t>
+                          <m:t>(</m:t>
                         </m:r>
                         <m:r>
                           <a:rPr lang="en-GB" b="0" i="1" smtClean="0">
@@ -10261,7 +11345,7 @@
             </p:txBody>
           </p:sp>
         </mc:Choice>
-        <mc:Fallback xmlns="">
+        <mc:Fallback>
           <p:sp>
             <p:nvSpPr>
               <p:cNvPr id="54" name="TextBox 53">
@@ -10306,8 +11390,8 @@
           </p:sp>
         </mc:Fallback>
       </mc:AlternateContent>
-      <mc:AlternateContent xmlns:mc="http://schemas.openxmlformats.org/markup-compatibility/2006" xmlns:a14="http://schemas.microsoft.com/office/drawing/2010/main">
-        <mc:Choice Requires="a14">
+      <mc:AlternateContent xmlns:mc="http://schemas.openxmlformats.org/markup-compatibility/2006">
+        <mc:Choice xmlns:a14="http://schemas.microsoft.com/office/drawing/2010/main" Requires="a14">
           <p:sp>
             <p:nvSpPr>
               <p:cNvPr id="56" name="TextBox 55">
@@ -10378,13 +11462,27 @@
                 </a14:m>
                 <a:r>
                   <a:rPr lang="en-GB" dirty="0"/>
-                  <a:t> S0</a:t>
+                  <a:t> S0 </a:t>
+                </a:r>
+                <a14:m>
+                  <m:oMath xmlns:m="http://schemas.openxmlformats.org/officeDocument/2006/math">
+                    <m:r>
+                      <a:rPr lang="en-GB" i="1">
+                        <a:latin typeface="Cambria Math" panose="02040503050406030204" pitchFamily="18" charset="0"/>
+                      </a:rPr>
+                      <m:t>/2</m:t>
+                    </m:r>
+                  </m:oMath>
+                </a14:m>
+                <a:r>
+                  <a:rPr lang="en-GB" dirty="0"/>
+                  <a:t> </a:t>
                 </a:r>
               </a:p>
             </p:txBody>
           </p:sp>
         </mc:Choice>
-        <mc:Fallback xmlns="">
+        <mc:Fallback>
           <p:sp>
             <p:nvSpPr>
               <p:cNvPr id="56" name="TextBox 55">

</xml_diff>